<commit_message>
Release Canidate 1.1 update PPT
</commit_message>
<xml_diff>
--- a/DataScience_Salaries.pptx
+++ b/DataScience_Salaries.pptx
@@ -228,7 +228,7 @@
           <a:p>
             <a:fld id="{91E551B2-72B9-4805-8062-4939F9ED4BD5}" type="datetimeFigureOut">
               <a:rPr lang="en-US"/>
-              <a:t>1/29/2023</a:t>
+              <a:t>1/30/2023</a:t>
             </a:fld>
             <a:endParaRPr lang="en-US" dirty="0"/>
           </a:p>
@@ -6461,7 +6461,7 @@
         <p:spPr>
           <a:xfrm>
             <a:off x="527050" y="1828800"/>
-            <a:ext cx="11137900" cy="4048124"/>
+            <a:ext cx="10153920" cy="4048124"/>
           </a:xfrm>
         </p:spPr>
         <p:txBody>
@@ -6504,6 +6504,29 @@
             <a:r>
               <a:rPr lang="en-US" dirty="0"/>
               <a:t>Postgres</a:t>
+            </a:r>
+          </a:p>
+          <a:p>
+            <a:r>
+              <a:rPr lang="en-US" dirty="0"/>
+              <a:t>Darkmode.js (</a:t>
+            </a:r>
+            <a:r>
+              <a:rPr lang="en-US" dirty="0">
+                <a:hlinkClick r:id="rId2"/>
+              </a:rPr>
+              <a:t>https://darkmodejs.learn.uno/</a:t>
+            </a:r>
+            <a:r>
+              <a:rPr lang="en-US" dirty="0"/>
+              <a:t>)</a:t>
+            </a:r>
+          </a:p>
+          <a:p>
+            <a:pPr lvl="1"/>
+            <a:r>
+              <a:rPr lang="en-US" dirty="0"/>
+              <a:t>JavaScript plugin/library, which adds a button to the bottom right of the screen to toggle between normal and dark mode. </a:t>
             </a:r>
           </a:p>
           <a:p>

</xml_diff>